<commit_message>
changed to line up with notes
</commit_message>
<xml_diff>
--- a/slides/Unit 2 - LC 101 - Class 1.pptx
+++ b/slides/Unit 2 - LC 101 - Class 1.pptx
@@ -7878,14 +7878,14 @@
               <a:buChar char="●"/>
             </a:pPr>
             <a:r>
-              <a:rPr lang="en" sz="2400">
+              <a:rPr lang="en" sz="2400" dirty="0">
                 <a:solidFill>
                   <a:srgbClr val="FFFFFF"/>
                 </a:solidFill>
               </a:rPr>
               <a:t>Making the VCS system aware of changes</a:t>
             </a:r>
-            <a:endParaRPr sz="2400">
+            <a:endParaRPr sz="2400" dirty="0">
               <a:solidFill>
                 <a:srgbClr val="FFFFFF"/>
               </a:solidFill>
@@ -7909,18 +7909,44 @@
               <a:buChar char="○"/>
             </a:pPr>
             <a:r>
-              <a:rPr lang="en" sz="2400">
+              <a:rPr lang="en" sz="2400" dirty="0">
                 <a:solidFill>
                   <a:srgbClr val="FFFFFF"/>
                 </a:solidFill>
               </a:rPr>
               <a:t>Could only be one file, but usually it will be more</a:t>
             </a:r>
-            <a:endParaRPr sz="2400">
+            <a:endParaRPr sz="2400" dirty="0">
               <a:solidFill>
                 <a:srgbClr val="FFFFFF"/>
               </a:solidFill>
             </a:endParaRPr>
+          </a:p>
+          <a:p>
+            <a:pPr marL="457200" lvl="0" indent="-381000" rtl="0">
+              <a:lnSpc>
+                <a:spcPct val="115000"/>
+              </a:lnSpc>
+              <a:spcBef>
+                <a:spcPts val="0"/>
+              </a:spcBef>
+              <a:spcAft>
+                <a:spcPts val="0"/>
+              </a:spcAft>
+              <a:buClr>
+                <a:srgbClr val="FFFFFF"/>
+              </a:buClr>
+              <a:buSzPts val="2400"/>
+              <a:buChar char="●"/>
+            </a:pPr>
+            <a:r>
+              <a:rPr lang="en" sz="2400" dirty="0">
+                <a:solidFill>
+                  <a:srgbClr val="FFFFFF"/>
+                </a:solidFill>
+              </a:rPr>
+              <a:t>This is how the changes are tracked, versioned, and shared</a:t>
+            </a:r>
           </a:p>
           <a:p>
             <a:pPr marL="457200" lvl="0" indent="-381000" rtl="0">
@@ -7945,9 +7971,17 @@
                   <a:srgbClr val="FFFFFF"/>
                 </a:solidFill>
               </a:rPr>
-              <a:t>This is how the changes are tracked, versioned, and shared</a:t>
+              <a:t>Adding </a:t>
             </a:r>
-            <a:endParaRPr sz="2400">
+            <a:r>
+              <a:rPr lang="en" sz="2400" dirty="0">
+                <a:solidFill>
+                  <a:srgbClr val="FFFFFF"/>
+                </a:solidFill>
+              </a:rPr>
+              <a:t>versus Committing</a:t>
+            </a:r>
+            <a:endParaRPr sz="2400" dirty="0">
               <a:solidFill>
                 <a:srgbClr val="FFFFFF"/>
               </a:solidFill>
@@ -7971,14 +8005,14 @@
               <a:buChar char="●"/>
             </a:pPr>
             <a:r>
-              <a:rPr lang="en" sz="2400">
+              <a:rPr lang="en" sz="2400" dirty="0">
                 <a:solidFill>
                   <a:srgbClr val="FFFFFF"/>
                 </a:solidFill>
               </a:rPr>
               <a:t>Commit message</a:t>
             </a:r>
-            <a:endParaRPr sz="2400">
+            <a:endParaRPr sz="2400" dirty="0">
               <a:solidFill>
                 <a:srgbClr val="FFFFFF"/>
               </a:solidFill>
@@ -8002,7 +8036,7 @@
               <a:buChar char="○"/>
             </a:pPr>
             <a:r>
-              <a:rPr lang="en" sz="2400">
+              <a:rPr lang="en" sz="2400" dirty="0">
                 <a:solidFill>
                   <a:srgbClr val="FFFFFF"/>
                 </a:solidFill>
@@ -8010,7 +8044,7 @@
               <a:t>Short message about </a:t>
             </a:r>
             <a:r>
-              <a:rPr lang="en" sz="2400" u="sng">
+              <a:rPr lang="en" sz="2400" u="sng" dirty="0">
                 <a:solidFill>
                   <a:srgbClr val="FFFFFF"/>
                 </a:solidFill>
@@ -8018,7 +8052,7 @@
               <a:t>why</a:t>
             </a:r>
             <a:r>
-              <a:rPr lang="en" sz="2400">
+              <a:rPr lang="en" sz="2400" dirty="0">
                 <a:solidFill>
                   <a:srgbClr val="FFFFFF"/>
                 </a:solidFill>
@@ -8026,7 +8060,7 @@
               <a:t> and </a:t>
             </a:r>
             <a:r>
-              <a:rPr lang="en" sz="2400" u="sng">
+              <a:rPr lang="en" sz="2400" u="sng" dirty="0">
                 <a:solidFill>
                   <a:srgbClr val="FFFFFF"/>
                 </a:solidFill>
@@ -8034,14 +8068,14 @@
               <a:t>what</a:t>
             </a:r>
             <a:r>
-              <a:rPr lang="en" sz="2400">
+              <a:rPr lang="en" sz="2400" dirty="0">
                 <a:solidFill>
                   <a:srgbClr val="FFFFFF"/>
                 </a:solidFill>
               </a:rPr>
               <a:t> you did</a:t>
             </a:r>
-            <a:endParaRPr sz="2400">
+            <a:endParaRPr sz="2400" dirty="0">
               <a:solidFill>
                 <a:srgbClr val="FFFFFF"/>
               </a:solidFill>
@@ -8065,14 +8099,14 @@
               <a:buChar char="○"/>
             </a:pPr>
             <a:r>
-              <a:rPr lang="en" sz="2400">
+              <a:rPr lang="en" sz="2400" dirty="0">
                 <a:solidFill>
                   <a:srgbClr val="FFFFFF"/>
                 </a:solidFill>
               </a:rPr>
               <a:t>You will need this because you will eventually forget why you did EVERYTHING</a:t>
             </a:r>
-            <a:endParaRPr sz="2400">
+            <a:endParaRPr sz="2400" dirty="0">
               <a:solidFill>
                 <a:srgbClr val="FFFFFF"/>
               </a:solidFill>
@@ -8091,7 +8125,7 @@
               </a:spcAft>
               <a:buNone/>
             </a:pPr>
-            <a:endParaRPr sz="2400">
+            <a:endParaRPr sz="2400" dirty="0">
               <a:solidFill>
                 <a:srgbClr val="FFFFFF"/>
               </a:solidFill>
@@ -8110,7 +8144,7 @@
               </a:spcAft>
               <a:buNone/>
             </a:pPr>
-            <a:endParaRPr sz="2400">
+            <a:endParaRPr sz="2400" dirty="0">
               <a:solidFill>
                 <a:srgbClr val="FFFFFF"/>
               </a:solidFill>
@@ -8129,7 +8163,7 @@
               </a:spcAft>
               <a:buNone/>
             </a:pPr>
-            <a:endParaRPr sz="2400">
+            <a:endParaRPr sz="2400" dirty="0">
               <a:solidFill>
                 <a:schemeClr val="dk1"/>
               </a:solidFill>
@@ -8148,7 +8182,7 @@
               </a:spcAft>
               <a:buNone/>
             </a:pPr>
-            <a:endParaRPr sz="2200">
+            <a:endParaRPr sz="2200" dirty="0">
               <a:solidFill>
                 <a:srgbClr val="FFFFFF"/>
               </a:solidFill>
@@ -8167,7 +8201,7 @@
               </a:spcAft>
               <a:buNone/>
             </a:pPr>
-            <a:endParaRPr sz="2200">
+            <a:endParaRPr sz="2200" dirty="0">
               <a:solidFill>
                 <a:srgbClr val="FFFFFF"/>
               </a:solidFill>
@@ -8186,7 +8220,7 @@
               </a:spcAft>
               <a:buNone/>
             </a:pPr>
-            <a:endParaRPr sz="2400">
+            <a:endParaRPr sz="2400" dirty="0">
               <a:solidFill>
                 <a:srgbClr val="FFFFFF"/>
               </a:solidFill>
@@ -8202,7 +8236,7 @@
               </a:spcAft>
               <a:buNone/>
             </a:pPr>
-            <a:endParaRPr sz="2400">
+            <a:endParaRPr sz="2400" dirty="0">
               <a:solidFill>
                 <a:srgbClr val="FFFFFF"/>
               </a:solidFill>
@@ -8636,372 +8670,6 @@
                                           <p:spTgt spid="93">
                                             <p:txEl>
                                               <p:pRg st="6" end="6"/>
-                                            </p:txEl>
-                                          </p:spTgt>
-                                        </p:tgtEl>
-                                      </p:cBhvr>
-                                    </p:animEffect>
-                                  </p:childTnLst>
-                                </p:cTn>
-                              </p:par>
-                            </p:childTnLst>
-                          </p:cTn>
-                        </p:par>
-                      </p:childTnLst>
-                    </p:cTn>
-                  </p:par>
-                  <p:par>
-                    <p:cTn id="38" fill="hold">
-                      <p:stCondLst>
-                        <p:cond delay="indefinite"/>
-                      </p:stCondLst>
-                      <p:childTnLst>
-                        <p:par>
-                          <p:cTn id="39" fill="hold">
-                            <p:stCondLst>
-                              <p:cond delay="0"/>
-                            </p:stCondLst>
-                            <p:childTnLst>
-                              <p:par>
-                                <p:cTn id="40" presetID="10" presetClass="entr" presetSubtype="0" fill="hold" nodeType="clickEffect">
-                                  <p:stCondLst>
-                                    <p:cond delay="0"/>
-                                  </p:stCondLst>
-                                  <p:childTnLst>
-                                    <p:set>
-                                      <p:cBhvr>
-                                        <p:cTn id="41" dur="1" fill="hold">
-                                          <p:stCondLst>
-                                            <p:cond delay="0"/>
-                                          </p:stCondLst>
-                                        </p:cTn>
-                                        <p:tgtEl>
-                                          <p:spTgt spid="93">
-                                            <p:txEl>
-                                              <p:pRg st="7" end="7"/>
-                                            </p:txEl>
-                                          </p:spTgt>
-                                        </p:tgtEl>
-                                        <p:attrNameLst>
-                                          <p:attrName>style.visibility</p:attrName>
-                                        </p:attrNameLst>
-                                      </p:cBhvr>
-                                      <p:to>
-                                        <p:strVal val="visible"/>
-                                      </p:to>
-                                    </p:set>
-                                    <p:animEffect transition="in" filter="fade">
-                                      <p:cBhvr>
-                                        <p:cTn id="42" dur="1000"/>
-                                        <p:tgtEl>
-                                          <p:spTgt spid="93">
-                                            <p:txEl>
-                                              <p:pRg st="7" end="7"/>
-                                            </p:txEl>
-                                          </p:spTgt>
-                                        </p:tgtEl>
-                                      </p:cBhvr>
-                                    </p:animEffect>
-                                  </p:childTnLst>
-                                </p:cTn>
-                              </p:par>
-                            </p:childTnLst>
-                          </p:cTn>
-                        </p:par>
-                      </p:childTnLst>
-                    </p:cTn>
-                  </p:par>
-                  <p:par>
-                    <p:cTn id="43" fill="hold">
-                      <p:stCondLst>
-                        <p:cond delay="indefinite"/>
-                      </p:stCondLst>
-                      <p:childTnLst>
-                        <p:par>
-                          <p:cTn id="44" fill="hold">
-                            <p:stCondLst>
-                              <p:cond delay="0"/>
-                            </p:stCondLst>
-                            <p:childTnLst>
-                              <p:par>
-                                <p:cTn id="45" presetID="10" presetClass="entr" presetSubtype="0" fill="hold" nodeType="clickEffect">
-                                  <p:stCondLst>
-                                    <p:cond delay="0"/>
-                                  </p:stCondLst>
-                                  <p:childTnLst>
-                                    <p:set>
-                                      <p:cBhvr>
-                                        <p:cTn id="46" dur="1" fill="hold">
-                                          <p:stCondLst>
-                                            <p:cond delay="0"/>
-                                          </p:stCondLst>
-                                        </p:cTn>
-                                        <p:tgtEl>
-                                          <p:spTgt spid="93">
-                                            <p:txEl>
-                                              <p:pRg st="8" end="8"/>
-                                            </p:txEl>
-                                          </p:spTgt>
-                                        </p:tgtEl>
-                                        <p:attrNameLst>
-                                          <p:attrName>style.visibility</p:attrName>
-                                        </p:attrNameLst>
-                                      </p:cBhvr>
-                                      <p:to>
-                                        <p:strVal val="visible"/>
-                                      </p:to>
-                                    </p:set>
-                                    <p:animEffect transition="in" filter="fade">
-                                      <p:cBhvr>
-                                        <p:cTn id="47" dur="1000"/>
-                                        <p:tgtEl>
-                                          <p:spTgt spid="93">
-                                            <p:txEl>
-                                              <p:pRg st="8" end="8"/>
-                                            </p:txEl>
-                                          </p:spTgt>
-                                        </p:tgtEl>
-                                      </p:cBhvr>
-                                    </p:animEffect>
-                                  </p:childTnLst>
-                                </p:cTn>
-                              </p:par>
-                            </p:childTnLst>
-                          </p:cTn>
-                        </p:par>
-                      </p:childTnLst>
-                    </p:cTn>
-                  </p:par>
-                  <p:par>
-                    <p:cTn id="48" fill="hold">
-                      <p:stCondLst>
-                        <p:cond delay="indefinite"/>
-                      </p:stCondLst>
-                      <p:childTnLst>
-                        <p:par>
-                          <p:cTn id="49" fill="hold">
-                            <p:stCondLst>
-                              <p:cond delay="0"/>
-                            </p:stCondLst>
-                            <p:childTnLst>
-                              <p:par>
-                                <p:cTn id="50" presetID="10" presetClass="entr" presetSubtype="0" fill="hold" nodeType="clickEffect">
-                                  <p:stCondLst>
-                                    <p:cond delay="0"/>
-                                  </p:stCondLst>
-                                  <p:childTnLst>
-                                    <p:set>
-                                      <p:cBhvr>
-                                        <p:cTn id="51" dur="1" fill="hold">
-                                          <p:stCondLst>
-                                            <p:cond delay="0"/>
-                                          </p:stCondLst>
-                                        </p:cTn>
-                                        <p:tgtEl>
-                                          <p:spTgt spid="93">
-                                            <p:txEl>
-                                              <p:pRg st="9" end="9"/>
-                                            </p:txEl>
-                                          </p:spTgt>
-                                        </p:tgtEl>
-                                        <p:attrNameLst>
-                                          <p:attrName>style.visibility</p:attrName>
-                                        </p:attrNameLst>
-                                      </p:cBhvr>
-                                      <p:to>
-                                        <p:strVal val="visible"/>
-                                      </p:to>
-                                    </p:set>
-                                    <p:animEffect transition="in" filter="fade">
-                                      <p:cBhvr>
-                                        <p:cTn id="52" dur="1000"/>
-                                        <p:tgtEl>
-                                          <p:spTgt spid="93">
-                                            <p:txEl>
-                                              <p:pRg st="9" end="9"/>
-                                            </p:txEl>
-                                          </p:spTgt>
-                                        </p:tgtEl>
-                                      </p:cBhvr>
-                                    </p:animEffect>
-                                  </p:childTnLst>
-                                </p:cTn>
-                              </p:par>
-                            </p:childTnLst>
-                          </p:cTn>
-                        </p:par>
-                      </p:childTnLst>
-                    </p:cTn>
-                  </p:par>
-                  <p:par>
-                    <p:cTn id="53" fill="hold">
-                      <p:stCondLst>
-                        <p:cond delay="indefinite"/>
-                      </p:stCondLst>
-                      <p:childTnLst>
-                        <p:par>
-                          <p:cTn id="54" fill="hold">
-                            <p:stCondLst>
-                              <p:cond delay="0"/>
-                            </p:stCondLst>
-                            <p:childTnLst>
-                              <p:par>
-                                <p:cTn id="55" presetID="10" presetClass="entr" presetSubtype="0" fill="hold" nodeType="clickEffect">
-                                  <p:stCondLst>
-                                    <p:cond delay="0"/>
-                                  </p:stCondLst>
-                                  <p:childTnLst>
-                                    <p:set>
-                                      <p:cBhvr>
-                                        <p:cTn id="56" dur="1" fill="hold">
-                                          <p:stCondLst>
-                                            <p:cond delay="0"/>
-                                          </p:stCondLst>
-                                        </p:cTn>
-                                        <p:tgtEl>
-                                          <p:spTgt spid="93">
-                                            <p:txEl>
-                                              <p:pRg st="10" end="10"/>
-                                            </p:txEl>
-                                          </p:spTgt>
-                                        </p:tgtEl>
-                                        <p:attrNameLst>
-                                          <p:attrName>style.visibility</p:attrName>
-                                        </p:attrNameLst>
-                                      </p:cBhvr>
-                                      <p:to>
-                                        <p:strVal val="visible"/>
-                                      </p:to>
-                                    </p:set>
-                                    <p:animEffect transition="in" filter="fade">
-                                      <p:cBhvr>
-                                        <p:cTn id="57" dur="1000"/>
-                                        <p:tgtEl>
-                                          <p:spTgt spid="93">
-                                            <p:txEl>
-                                              <p:pRg st="10" end="10"/>
-                                            </p:txEl>
-                                          </p:spTgt>
-                                        </p:tgtEl>
-                                      </p:cBhvr>
-                                    </p:animEffect>
-                                  </p:childTnLst>
-                                </p:cTn>
-                              </p:par>
-                            </p:childTnLst>
-                          </p:cTn>
-                        </p:par>
-                      </p:childTnLst>
-                    </p:cTn>
-                  </p:par>
-                  <p:par>
-                    <p:cTn id="58" fill="hold">
-                      <p:stCondLst>
-                        <p:cond delay="indefinite"/>
-                      </p:stCondLst>
-                      <p:childTnLst>
-                        <p:par>
-                          <p:cTn id="59" fill="hold">
-                            <p:stCondLst>
-                              <p:cond delay="0"/>
-                            </p:stCondLst>
-                            <p:childTnLst>
-                              <p:par>
-                                <p:cTn id="60" presetID="10" presetClass="entr" presetSubtype="0" fill="hold" nodeType="clickEffect">
-                                  <p:stCondLst>
-                                    <p:cond delay="0"/>
-                                  </p:stCondLst>
-                                  <p:childTnLst>
-                                    <p:set>
-                                      <p:cBhvr>
-                                        <p:cTn id="61" dur="1" fill="hold">
-                                          <p:stCondLst>
-                                            <p:cond delay="0"/>
-                                          </p:stCondLst>
-                                        </p:cTn>
-                                        <p:tgtEl>
-                                          <p:spTgt spid="93">
-                                            <p:txEl>
-                                              <p:pRg st="11" end="11"/>
-                                            </p:txEl>
-                                          </p:spTgt>
-                                        </p:tgtEl>
-                                        <p:attrNameLst>
-                                          <p:attrName>style.visibility</p:attrName>
-                                        </p:attrNameLst>
-                                      </p:cBhvr>
-                                      <p:to>
-                                        <p:strVal val="visible"/>
-                                      </p:to>
-                                    </p:set>
-                                    <p:animEffect transition="in" filter="fade">
-                                      <p:cBhvr>
-                                        <p:cTn id="62" dur="1000"/>
-                                        <p:tgtEl>
-                                          <p:spTgt spid="93">
-                                            <p:txEl>
-                                              <p:pRg st="11" end="11"/>
-                                            </p:txEl>
-                                          </p:spTgt>
-                                        </p:tgtEl>
-                                      </p:cBhvr>
-                                    </p:animEffect>
-                                  </p:childTnLst>
-                                </p:cTn>
-                              </p:par>
-                            </p:childTnLst>
-                          </p:cTn>
-                        </p:par>
-                      </p:childTnLst>
-                    </p:cTn>
-                  </p:par>
-                  <p:par>
-                    <p:cTn id="63" fill="hold">
-                      <p:stCondLst>
-                        <p:cond delay="indefinite"/>
-                      </p:stCondLst>
-                      <p:childTnLst>
-                        <p:par>
-                          <p:cTn id="64" fill="hold">
-                            <p:stCondLst>
-                              <p:cond delay="0"/>
-                            </p:stCondLst>
-                            <p:childTnLst>
-                              <p:par>
-                                <p:cTn id="65" presetID="10" presetClass="entr" presetSubtype="0" fill="hold" nodeType="clickEffect">
-                                  <p:stCondLst>
-                                    <p:cond delay="0"/>
-                                  </p:stCondLst>
-                                  <p:childTnLst>
-                                    <p:set>
-                                      <p:cBhvr>
-                                        <p:cTn id="66" dur="1" fill="hold">
-                                          <p:stCondLst>
-                                            <p:cond delay="0"/>
-                                          </p:stCondLst>
-                                        </p:cTn>
-                                        <p:tgtEl>
-                                          <p:spTgt spid="93">
-                                            <p:txEl>
-                                              <p:pRg st="12" end="12"/>
-                                            </p:txEl>
-                                          </p:spTgt>
-                                        </p:tgtEl>
-                                        <p:attrNameLst>
-                                          <p:attrName>style.visibility</p:attrName>
-                                        </p:attrNameLst>
-                                      </p:cBhvr>
-                                      <p:to>
-                                        <p:strVal val="visible"/>
-                                      </p:to>
-                                    </p:set>
-                                    <p:animEffect transition="in" filter="fade">
-                                      <p:cBhvr>
-                                        <p:cTn id="67" dur="1000"/>
-                                        <p:tgtEl>
-                                          <p:spTgt spid="93">
-                                            <p:txEl>
-                                              <p:pRg st="12" end="12"/>
                                             </p:txEl>
                                           </p:spTgt>
                                         </p:tgtEl>
@@ -11846,7 +11514,7 @@
                   <a:srgbClr val="FFFFFF"/>
                 </a:solidFill>
               </a:rPr>
-              <a:t>Studio Solution, Lecture, Studio Walkthrough Studio</a:t>
+              <a:t>Studio Solution, Lecture, Studio Walkthrough, Studio</a:t>
             </a:r>
           </a:p>
           <a:p>

</xml_diff>

<commit_message>
finishing up slides. need to finish git
</commit_message>
<xml_diff>
--- a/slides/Unit 2 - LC 101 - Class 1.pptx
+++ b/slides/Unit 2 - LC 101 - Class 1.pptx
@@ -10867,6 +10867,17 @@
               </a:rPr>
               <a:t>Expectations:</a:t>
             </a:r>
+          </a:p>
+          <a:p>
+            <a:pPr marL="82550" lvl="0">
+              <a:lnSpc>
+                <a:spcPct val="115000"/>
+              </a:lnSpc>
+              <a:buClr>
+                <a:srgbClr val="FFFFFF"/>
+              </a:buClr>
+              <a:buSzPts val="2300"/>
+            </a:pPr>
             <a:endParaRPr lang="en-US" sz="2300" dirty="0">
               <a:solidFill>
                 <a:srgbClr val="FFFFFF"/>
@@ -11416,7 +11427,7 @@
                                         <p:tgtEl>
                                           <p:spTgt spid="75">
                                             <p:txEl>
-                                              <p:pRg st="5" end="5"/>
+                                              <p:pRg st="6" end="6"/>
                                             </p:txEl>
                                           </p:spTgt>
                                         </p:tgtEl>
@@ -11434,7 +11445,7 @@
                                         <p:tgtEl>
                                           <p:spTgt spid="75">
                                             <p:txEl>
-                                              <p:pRg st="5" end="5"/>
+                                              <p:pRg st="6" end="6"/>
                                             </p:txEl>
                                           </p:spTgt>
                                         </p:tgtEl>
@@ -11477,7 +11488,7 @@
                                         <p:tgtEl>
                                           <p:spTgt spid="75">
                                             <p:txEl>
-                                              <p:pRg st="6" end="6"/>
+                                              <p:pRg st="7" end="7"/>
                                             </p:txEl>
                                           </p:spTgt>
                                         </p:tgtEl>
@@ -11495,7 +11506,7 @@
                                         <p:tgtEl>
                                           <p:spTgt spid="75">
                                             <p:txEl>
-                                              <p:pRg st="6" end="6"/>
+                                              <p:pRg st="7" end="7"/>
                                             </p:txEl>
                                           </p:spTgt>
                                         </p:tgtEl>
@@ -11538,7 +11549,7 @@
                                         <p:tgtEl>
                                           <p:spTgt spid="75">
                                             <p:txEl>
-                                              <p:pRg st="8" end="8"/>
+                                              <p:pRg st="9" end="9"/>
                                             </p:txEl>
                                           </p:spTgt>
                                         </p:tgtEl>
@@ -11556,7 +11567,7 @@
                                         <p:tgtEl>
                                           <p:spTgt spid="75">
                                             <p:txEl>
-                                              <p:pRg st="8" end="8"/>
+                                              <p:pRg st="9" end="9"/>
                                             </p:txEl>
                                           </p:spTgt>
                                         </p:tgtEl>
@@ -11599,7 +11610,7 @@
                                         <p:tgtEl>
                                           <p:spTgt spid="75">
                                             <p:txEl>
-                                              <p:pRg st="9" end="9"/>
+                                              <p:pRg st="10" end="10"/>
                                             </p:txEl>
                                           </p:spTgt>
                                         </p:tgtEl>
@@ -11617,7 +11628,7 @@
                                         <p:tgtEl>
                                           <p:spTgt spid="75">
                                             <p:txEl>
-                                              <p:pRg st="9" end="9"/>
+                                              <p:pRg st="10" end="10"/>
                                             </p:txEl>
                                           </p:spTgt>
                                         </p:tgtEl>

</xml_diff>